<commit_message>
update german translation and add link to pdf
</commit_message>
<xml_diff>
--- a/lesson_1/lesson_1_ger.pptx
+++ b/lesson_1/lesson_1_ger.pptx
@@ -27,7 +27,7 @@
   <p:notesSz cx="6858000" cy="9144000"/>
   <p:embeddedFontLst>
     <p:embeddedFont>
-      <p:font typeface="Abril Fatface" panose="02000503000000020003" pitchFamily="2" charset="0"/>
+      <p:font typeface="Abril Fatface" panose="02000503000000020003" pitchFamily="2" charset="77"/>
       <p:regular r:id="rId17"/>
     </p:embeddedFont>
     <p:embeddedFont>
@@ -45,7 +45,7 @@
       <p:boldItalic r:id="rId25"/>
     </p:embeddedFont>
     <p:embeddedFont>
-      <p:font typeface="Roboto Mono" panose="00000009000000000000" pitchFamily="49" charset="0"/>
+      <p:font typeface="Roboto Mono" pitchFamily="49" charset="0"/>
       <p:regular r:id="rId26"/>
       <p:bold r:id="rId27"/>
       <p:italic r:id="rId28"/>
@@ -11109,7 +11109,7 @@
             </a:pPr>
             <a:fld id="{00000000-1234-1234-1234-123412341234}" type="slidenum">
               <a:rPr lang="en"/>
-              <a:t>‹Nr.›</a:t>
+              <a:t>‹#›</a:t>
             </a:fld>
             <a:endParaRPr/>
           </a:p>
@@ -22337,7 +22337,7 @@
           <a:p>
             <a:r>
               <a:rPr lang="de-DE" dirty="0"/>
-              <a:t>See </a:t>
+              <a:t>Siehe </a:t>
             </a:r>
             <a:r>
               <a:rPr lang="de-DE" dirty="0">
@@ -22345,9 +22345,37 @@
                   <a:srgbClr val="AF81A6"/>
                 </a:solidFill>
               </a:rPr>
-              <a:t>installation.pdf</a:t>
+              <a:t>https://</a:t>
             </a:r>
-            <a:endParaRPr lang="de-DE" dirty="0"/>
+            <a:r>
+              <a:rPr lang="de-DE" dirty="0" err="1">
+                <a:solidFill>
+                  <a:srgbClr val="AF81A6"/>
+                </a:solidFill>
+              </a:rPr>
+              <a:t>stura.link</a:t>
+            </a:r>
+            <a:r>
+              <a:rPr lang="de-DE" dirty="0">
+                <a:solidFill>
+                  <a:srgbClr val="AF81A6"/>
+                </a:solidFill>
+              </a:rPr>
+              <a:t>/</a:t>
+            </a:r>
+            <a:r>
+              <a:rPr lang="de-DE" dirty="0" err="1">
+                <a:solidFill>
+                  <a:srgbClr val="AF81A6"/>
+                </a:solidFill>
+              </a:rPr>
+              <a:t>pyInstall</a:t>
+            </a:r>
+            <a:endParaRPr lang="de-DE" dirty="0">
+              <a:solidFill>
+                <a:srgbClr val="AF81A6"/>
+              </a:solidFill>
+            </a:endParaRPr>
           </a:p>
         </p:txBody>
       </p:sp>

</xml_diff>